<commit_message>
update, prepare to switch to github
</commit_message>
<xml_diff>
--- a/source/vsf/documents/vsf_brief.pptx
+++ b/source/vsf/documents/vsf_brief.pptx
@@ -5491,7 +5491,7 @@
         </p:spPr>
         <p:txBody>
           <a:bodyPr>
-            <a:normAutofit fontScale="92500" lnSpcReduction="10000"/>
+            <a:normAutofit fontScale="92500" lnSpcReduction="20000"/>
           </a:bodyPr>
           <a:lstStyle/>
           <a:p>
@@ -5904,11 +5904,91 @@
               <a:buSzTx/>
             </a:pPr>
             <a:r>
+              <a:rPr lang="en-US" altLang="zh-CN" sz="1705" dirty="0">
+                <a:latin typeface="幼圆" panose="02010509060101010101" pitchFamily="49" charset="-122"/>
+                <a:ea typeface="幼圆" panose="02010509060101010101" pitchFamily="49" charset="-122"/>
+              </a:rPr>
+              <a:t>winpcap(npcap)</a:t>
+            </a:r>
+            <a:r>
               <a:rPr lang="zh-CN" altLang="en-US" sz="1705" dirty="0">
                 <a:latin typeface="幼圆" panose="02010509060101010101" pitchFamily="49" charset="-122"/>
                 <a:ea typeface="幼圆" panose="02010509060101010101" pitchFamily="49" charset="-122"/>
               </a:rPr>
-              <a:t>虚拟网卡模拟网络设备驱动</a:t>
+              <a:t>模拟网络设备驱动</a:t>
+            </a:r>
+            <a:endParaRPr lang="zh-CN" altLang="en-US" sz="1705" dirty="0">
+              <a:latin typeface="幼圆" panose="02010509060101010101" pitchFamily="49" charset="-122"/>
+              <a:ea typeface="幼圆" panose="02010509060101010101" pitchFamily="49" charset="-122"/>
+            </a:endParaRPr>
+          </a:p>
+          <a:p>
+            <a:pPr lvl="2" algn="l">
+              <a:buClrTx/>
+              <a:buSzTx/>
+            </a:pPr>
+            <a:r>
+              <a:rPr lang="zh-CN" altLang="en-US" sz="1705" dirty="0">
+                <a:latin typeface="幼圆" panose="02010509060101010101" pitchFamily="49" charset="-122"/>
+                <a:ea typeface="幼圆" panose="02010509060101010101" pitchFamily="49" charset="-122"/>
+              </a:rPr>
+              <a:t>支持</a:t>
+            </a:r>
+            <a:r>
+              <a:rPr lang="en-US" altLang="zh-CN" sz="1705" dirty="0">
+                <a:latin typeface="幼圆" panose="02010509060101010101" pitchFamily="49" charset="-122"/>
+                <a:ea typeface="幼圆" panose="02010509060101010101" pitchFamily="49" charset="-122"/>
+              </a:rPr>
+              <a:t>H2 USB</a:t>
+            </a:r>
+            <a:r>
+              <a:rPr lang="zh-CN" altLang="en-US" sz="1705" dirty="0">
+                <a:latin typeface="幼圆" panose="02010509060101010101" pitchFamily="49" charset="-122"/>
+                <a:ea typeface="幼圆" panose="02010509060101010101" pitchFamily="49" charset="-122"/>
+              </a:rPr>
+              <a:t>蓝牙</a:t>
+            </a:r>
+            <a:r>
+              <a:rPr lang="en-US" altLang="zh-CN" sz="1705" dirty="0">
+                <a:latin typeface="幼圆" panose="02010509060101010101" pitchFamily="49" charset="-122"/>
+                <a:ea typeface="幼圆" panose="02010509060101010101" pitchFamily="49" charset="-122"/>
+              </a:rPr>
+              <a:t>dongle(</a:t>
+            </a:r>
+            <a:r>
+              <a:rPr lang="zh-CN" altLang="en-US" sz="1705" dirty="0">
+                <a:latin typeface="幼圆" panose="02010509060101010101" pitchFamily="49" charset="-122"/>
+                <a:ea typeface="幼圆" panose="02010509060101010101" pitchFamily="49" charset="-122"/>
+              </a:rPr>
+              <a:t>通过</a:t>
+            </a:r>
+            <a:r>
+              <a:rPr lang="en-US" altLang="zh-CN" sz="1705" dirty="0">
+                <a:latin typeface="幼圆" panose="02010509060101010101" pitchFamily="49" charset="-122"/>
+                <a:ea typeface="幼圆" panose="02010509060101010101" pitchFamily="49" charset="-122"/>
+              </a:rPr>
+              <a:t>winusb</a:t>
+            </a:r>
+            <a:r>
+              <a:rPr lang="zh-CN" altLang="en-US" sz="1705" dirty="0">
+                <a:latin typeface="幼圆" panose="02010509060101010101" pitchFamily="49" charset="-122"/>
+                <a:ea typeface="幼圆" panose="02010509060101010101" pitchFamily="49" charset="-122"/>
+              </a:rPr>
+              <a:t>模拟的</a:t>
+            </a:r>
+            <a:r>
+              <a:rPr lang="en-US" altLang="zh-CN" sz="1705" dirty="0">
+                <a:latin typeface="幼圆" panose="02010509060101010101" pitchFamily="49" charset="-122"/>
+                <a:ea typeface="幼圆" panose="02010509060101010101" pitchFamily="49" charset="-122"/>
+              </a:rPr>
+              <a:t>usb_hcd</a:t>
+            </a:r>
+            <a:r>
+              <a:rPr lang="en-US" altLang="zh-CN" sz="1705" dirty="0">
+                <a:latin typeface="幼圆" panose="02010509060101010101" pitchFamily="49" charset="-122"/>
+                <a:ea typeface="幼圆" panose="02010509060101010101" pitchFamily="49" charset="-122"/>
+              </a:rPr>
+              <a:t>)</a:t>
             </a:r>
             <a:endParaRPr lang="zh-CN" altLang="en-US" sz="1705" dirty="0">
               <a:latin typeface="幼圆" panose="02010509060101010101" pitchFamily="49" charset="-122"/>

</xml_diff>